<commit_message>
Added QR code to PowerPoint
</commit_message>
<xml_diff>
--- a/Video Game Market Analys.pptx
+++ b/Video Game Market Analys.pptx
@@ -43,7 +43,7 @@
       <p:boldItalic r:id="rId26"/>
     </p:embeddedFont>
     <p:embeddedFont>
-      <p:font typeface="Open Sans Light" panose="020F0302020204030204" pitchFamily="34" charset="0"/>
+      <p:font typeface="Open Sans Light" panose="020B0306030504020204" pitchFamily="34" charset="0"/>
       <p:regular r:id="rId27"/>
       <p:italic r:id="rId28"/>
     </p:embeddedFont>
@@ -53,7 +53,7 @@
       <p:bold r:id="rId30"/>
     </p:embeddedFont>
     <p:embeddedFont>
-      <p:font typeface="Raleway" pitchFamily="2" charset="0"/>
+      <p:font typeface="Raleway" pitchFamily="2" charset="77"/>
       <p:regular r:id="rId31"/>
       <p:bold r:id="rId32"/>
       <p:italic r:id="rId33"/>
@@ -20206,6 +20206,78 @@
           </p:txBody>
         </p:sp>
       </p:grpSp>
+      <p:pic>
+        <p:nvPicPr>
+          <p:cNvPr id="3" name="Picture 2" descr="A qr code with a white background&#10;&#10;AI-generated content may be incorrect.">
+            <a:extLst>
+              <a:ext uri="{FF2B5EF4-FFF2-40B4-BE49-F238E27FC236}">
+                <a16:creationId xmlns:a16="http://schemas.microsoft.com/office/drawing/2014/main" id="{0FC3262E-5FD1-B708-263C-D10D394BBBBA}"/>
+              </a:ext>
+            </a:extLst>
+          </p:cNvPr>
+          <p:cNvPicPr>
+            <a:picLocks noChangeAspect="1"/>
+          </p:cNvPicPr>
+          <p:nvPr/>
+        </p:nvPicPr>
+        <p:blipFill>
+          <a:blip r:embed="rId3"/>
+          <a:stretch>
+            <a:fillRect/>
+          </a:stretch>
+        </p:blipFill>
+        <p:spPr>
+          <a:xfrm>
+            <a:off x="6015150" y="3304800"/>
+            <a:ext cx="1027800" cy="1027800"/>
+          </a:xfrm>
+          <a:prstGeom prst="rect">
+            <a:avLst/>
+          </a:prstGeom>
+        </p:spPr>
+      </p:pic>
+      <p:pic>
+        <p:nvPicPr>
+          <p:cNvPr id="5" name="Picture 4" descr="A black cat in a circle&#10;&#10;AI-generated content may be incorrect.">
+            <a:extLst>
+              <a:ext uri="{FF2B5EF4-FFF2-40B4-BE49-F238E27FC236}">
+                <a16:creationId xmlns:a16="http://schemas.microsoft.com/office/drawing/2014/main" id="{7689E3BE-4347-44F0-E0F0-7BCB3875ACE6}"/>
+              </a:ext>
+            </a:extLst>
+          </p:cNvPr>
+          <p:cNvPicPr>
+            <a:picLocks noChangeAspect="1"/>
+          </p:cNvPicPr>
+          <p:nvPr/>
+        </p:nvPicPr>
+        <p:blipFill>
+          <a:blip r:embed="rId4">
+            <a:extLst>
+              <a:ext uri="{BEBA8EAE-BF5A-486C-A8C5-ECC9F3942E4B}">
+                <a14:imgProps xmlns:a14="http://schemas.microsoft.com/office/drawing/2010/main">
+                  <a14:imgLayer r:embed="rId5">
+                    <a14:imgEffect>
+                      <a14:brightnessContrast bright="100000"/>
+                    </a14:imgEffect>
+                  </a14:imgLayer>
+                </a14:imgProps>
+              </a:ext>
+            </a:extLst>
+          </a:blip>
+          <a:stretch>
+            <a:fillRect/>
+          </a:stretch>
+        </p:blipFill>
+        <p:spPr>
+          <a:xfrm>
+            <a:off x="4985722" y="3345514"/>
+            <a:ext cx="907571" cy="907571"/>
+          </a:xfrm>
+          <a:prstGeom prst="rect">
+            <a:avLst/>
+          </a:prstGeom>
+        </p:spPr>
+      </p:pic>
     </p:spTree>
     <p:extLst>
       <p:ext uri="{BB962C8B-B14F-4D97-AF65-F5344CB8AC3E}">

</xml_diff>

<commit_message>
Update Video Game Market Analys.pptx
</commit_message>
<xml_diff>
--- a/Video Game Market Analys.pptx
+++ b/Video Game Market Analys.pptx
@@ -5,7 +5,7 @@
     <p:sldMasterId id="2147483671" r:id="rId1"/>
   </p:sldMasterIdLst>
   <p:notesMasterIdLst>
-    <p:notesMasterId r:id="rId18"/>
+    <p:notesMasterId r:id="rId19"/>
   </p:notesMasterIdLst>
   <p:sldIdLst>
     <p:sldId id="256" r:id="rId2"/>
@@ -23,41 +23,42 @@
     <p:sldId id="305" r:id="rId14"/>
     <p:sldId id="301" r:id="rId15"/>
     <p:sldId id="270" r:id="rId16"/>
-    <p:sldId id="306" r:id="rId17"/>
+    <p:sldId id="307" r:id="rId17"/>
+    <p:sldId id="306" r:id="rId18"/>
   </p:sldIdLst>
   <p:sldSz cx="9144000" cy="5143500" type="screen16x9"/>
   <p:notesSz cx="6858000" cy="9144000"/>
   <p:embeddedFontLst>
     <p:embeddedFont>
       <p:font typeface="Kanit" pitchFamily="2" charset="-34"/>
-      <p:regular r:id="rId19"/>
-      <p:bold r:id="rId20"/>
-      <p:italic r:id="rId21"/>
-      <p:boldItalic r:id="rId22"/>
+      <p:regular r:id="rId20"/>
+      <p:bold r:id="rId21"/>
+      <p:italic r:id="rId22"/>
+      <p:boldItalic r:id="rId23"/>
     </p:embeddedFont>
     <p:embeddedFont>
       <p:font typeface="Kanit Light" pitchFamily="2" charset="-34"/>
-      <p:regular r:id="rId23"/>
-      <p:bold r:id="rId24"/>
-      <p:italic r:id="rId25"/>
-      <p:boldItalic r:id="rId26"/>
+      <p:regular r:id="rId24"/>
+      <p:bold r:id="rId25"/>
+      <p:italic r:id="rId26"/>
+      <p:boldItalic r:id="rId27"/>
     </p:embeddedFont>
     <p:embeddedFont>
       <p:font typeface="Open Sans Light" panose="020B0306030504020204" pitchFamily="34" charset="0"/>
-      <p:regular r:id="rId27"/>
-      <p:italic r:id="rId28"/>
+      <p:regular r:id="rId28"/>
+      <p:italic r:id="rId29"/>
     </p:embeddedFont>
     <p:embeddedFont>
       <p:font typeface="Orbitron" pitchFamily="2" charset="0"/>
-      <p:regular r:id="rId29"/>
-      <p:bold r:id="rId30"/>
+      <p:regular r:id="rId30"/>
+      <p:bold r:id="rId31"/>
     </p:embeddedFont>
     <p:embeddedFont>
       <p:font typeface="Raleway" pitchFamily="2" charset="77"/>
-      <p:regular r:id="rId31"/>
-      <p:bold r:id="rId32"/>
-      <p:italic r:id="rId33"/>
-      <p:boldItalic r:id="rId34"/>
+      <p:regular r:id="rId32"/>
+      <p:bold r:id="rId33"/>
+      <p:italic r:id="rId34"/>
+      <p:boldItalic r:id="rId35"/>
     </p:embeddedFont>
   </p:embeddedFontLst>
   <p:defaultTextStyle>
@@ -1586,6 +1587,133 @@
   <p:cSld>
     <p:spTree>
       <p:nvGrpSpPr>
+        <p:cNvPr id="1" name="Shape 427">
+          <a:extLst>
+            <a:ext uri="{FF2B5EF4-FFF2-40B4-BE49-F238E27FC236}">
+              <a16:creationId xmlns:a16="http://schemas.microsoft.com/office/drawing/2014/main" id="{6A6A9F31-957B-ACF2-D707-3FCB6EC06C6A}"/>
+            </a:ext>
+          </a:extLst>
+        </p:cNvPr>
+        <p:cNvGrpSpPr/>
+        <p:nvPr/>
+      </p:nvGrpSpPr>
+      <p:grpSpPr>
+        <a:xfrm>
+          <a:off x="0" y="0"/>
+          <a:ext cx="0" cy="0"/>
+          <a:chOff x="0" y="0"/>
+          <a:chExt cx="0" cy="0"/>
+        </a:xfrm>
+      </p:grpSpPr>
+      <p:sp>
+        <p:nvSpPr>
+          <p:cNvPr id="428" name="Google Shape;428;g1ff18b49f31_1_80:notes">
+            <a:extLst>
+              <a:ext uri="{FF2B5EF4-FFF2-40B4-BE49-F238E27FC236}">
+                <a16:creationId xmlns:a16="http://schemas.microsoft.com/office/drawing/2014/main" id="{7E1F9B1C-5081-9C4A-0456-57166E7ACA10}"/>
+              </a:ext>
+            </a:extLst>
+          </p:cNvPr>
+          <p:cNvSpPr>
+            <a:spLocks noGrp="1" noRot="1" noChangeAspect="1"/>
+          </p:cNvSpPr>
+          <p:nvPr>
+            <p:ph type="sldImg" idx="2"/>
+          </p:nvPr>
+        </p:nvSpPr>
+        <p:spPr>
+          <a:xfrm>
+            <a:off x="381000" y="685800"/>
+            <a:ext cx="6096000" cy="3429000"/>
+          </a:xfrm>
+          <a:custGeom>
+            <a:avLst/>
+            <a:gdLst/>
+            <a:ahLst/>
+            <a:cxnLst/>
+            <a:rect l="l" t="t" r="r" b="b"/>
+            <a:pathLst>
+              <a:path w="120000" h="120000" extrusionOk="0">
+                <a:moveTo>
+                  <a:pt x="0" y="0"/>
+                </a:moveTo>
+                <a:lnTo>
+                  <a:pt x="120000" y="0"/>
+                </a:lnTo>
+                <a:lnTo>
+                  <a:pt x="120000" y="120000"/>
+                </a:lnTo>
+                <a:lnTo>
+                  <a:pt x="0" y="120000"/>
+                </a:lnTo>
+                <a:close/>
+              </a:path>
+            </a:pathLst>
+          </a:custGeom>
+        </p:spPr>
+      </p:sp>
+      <p:sp>
+        <p:nvSpPr>
+          <p:cNvPr id="429" name="Google Shape;429;g1ff18b49f31_1_80:notes">
+            <a:extLst>
+              <a:ext uri="{FF2B5EF4-FFF2-40B4-BE49-F238E27FC236}">
+                <a16:creationId xmlns:a16="http://schemas.microsoft.com/office/drawing/2014/main" id="{8DDCDD47-931E-E23C-564F-2743543EB585}"/>
+              </a:ext>
+            </a:extLst>
+          </p:cNvPr>
+          <p:cNvSpPr txBox="1">
+            <a:spLocks noGrp="1"/>
+          </p:cNvSpPr>
+          <p:nvPr>
+            <p:ph type="body" idx="1"/>
+          </p:nvPr>
+        </p:nvSpPr>
+        <p:spPr>
+          <a:xfrm>
+            <a:off x="685800" y="4343400"/>
+            <a:ext cx="5486400" cy="4114800"/>
+          </a:xfrm>
+          <a:prstGeom prst="rect">
+            <a:avLst/>
+          </a:prstGeom>
+        </p:spPr>
+        <p:txBody>
+          <a:bodyPr spcFirstLastPara="1" wrap="square" lIns="91425" tIns="91425" rIns="91425" bIns="91425" anchor="t" anchorCtr="0">
+            <a:noAutofit/>
+          </a:bodyPr>
+          <a:lstStyle/>
+          <a:p>
+            <a:pPr marL="0" lvl="0" indent="0" algn="l" rtl="0">
+              <a:spcBef>
+                <a:spcPts val="0"/>
+              </a:spcBef>
+              <a:spcAft>
+                <a:spcPts val="0"/>
+              </a:spcAft>
+              <a:buNone/>
+            </a:pPr>
+            <a:endParaRPr/>
+          </a:p>
+        </p:txBody>
+      </p:sp>
+    </p:spTree>
+    <p:extLst>
+      <p:ext uri="{BB962C8B-B14F-4D97-AF65-F5344CB8AC3E}">
+        <p14:creationId xmlns:p14="http://schemas.microsoft.com/office/powerpoint/2010/main" val="1668700415"/>
+      </p:ext>
+    </p:extLst>
+  </p:cSld>
+  <p:clrMapOvr>
+    <a:masterClrMapping/>
+  </p:clrMapOvr>
+</p:notes>
+</file>
+
+<file path=ppt/notesSlides/notesSlide17.xml><?xml version="1.0" encoding="utf-8"?>
+<p:notes xmlns:a="http://schemas.openxmlformats.org/drawingml/2006/main" xmlns:r="http://schemas.openxmlformats.org/officeDocument/2006/relationships" xmlns:p="http://schemas.openxmlformats.org/presentationml/2006/main" showMasterSp="0" showMasterPhAnim="0">
+  <p:cSld>
+    <p:spTree>
+      <p:nvGrpSpPr>
         <p:cNvPr id="1" name="Shape 237">
           <a:extLst>
             <a:ext uri="{FF2B5EF4-FFF2-40B4-BE49-F238E27FC236}">
@@ -1691,7 +1819,7 @@
               </a:spcAft>
               <a:buNone/>
             </a:pPr>
-            <a:endParaRPr/>
+            <a:endParaRPr dirty="0"/>
           </a:p>
         </p:txBody>
       </p:sp>
@@ -13415,7 +13543,7 @@
           <a:p>
             <a:r>
               <a:rPr lang="en" sz="1100" dirty="0"/>
-              <a:t>Authors:</a:t>
+              <a:t>Presenters:</a:t>
             </a:r>
           </a:p>
           <a:p>
@@ -19709,6 +19837,790 @@
   <p:cSld>
     <p:spTree>
       <p:nvGrpSpPr>
+        <p:cNvPr id="1" name="Shape 430">
+          <a:extLst>
+            <a:ext uri="{FF2B5EF4-FFF2-40B4-BE49-F238E27FC236}">
+              <a16:creationId xmlns:a16="http://schemas.microsoft.com/office/drawing/2014/main" id="{885F7FC6-CFC1-BCBC-1009-0F96ACAE2F48}"/>
+            </a:ext>
+          </a:extLst>
+        </p:cNvPr>
+        <p:cNvGrpSpPr/>
+        <p:nvPr/>
+      </p:nvGrpSpPr>
+      <p:grpSpPr>
+        <a:xfrm>
+          <a:off x="0" y="0"/>
+          <a:ext cx="0" cy="0"/>
+          <a:chOff x="0" y="0"/>
+          <a:chExt cx="0" cy="0"/>
+        </a:xfrm>
+      </p:grpSpPr>
+      <p:sp>
+        <p:nvSpPr>
+          <p:cNvPr id="431" name="Google Shape;431;p40">
+            <a:extLst>
+              <a:ext uri="{FF2B5EF4-FFF2-40B4-BE49-F238E27FC236}">
+                <a16:creationId xmlns:a16="http://schemas.microsoft.com/office/drawing/2014/main" id="{5CE01DD7-15EC-5D26-BA40-01E3681954D0}"/>
+              </a:ext>
+            </a:extLst>
+          </p:cNvPr>
+          <p:cNvSpPr txBox="1">
+            <a:spLocks noGrp="1"/>
+          </p:cNvSpPr>
+          <p:nvPr>
+            <p:ph type="title"/>
+          </p:nvPr>
+        </p:nvSpPr>
+        <p:spPr>
+          <a:xfrm flipH="1">
+            <a:off x="537411" y="257207"/>
+            <a:ext cx="7512435" cy="1012200"/>
+          </a:xfrm>
+          <a:prstGeom prst="rect">
+            <a:avLst/>
+          </a:prstGeom>
+        </p:spPr>
+        <p:txBody>
+          <a:bodyPr spcFirstLastPara="1" wrap="square" lIns="91425" tIns="91425" rIns="91425" bIns="91425" anchor="b" anchorCtr="0">
+            <a:noAutofit/>
+          </a:bodyPr>
+          <a:lstStyle/>
+          <a:p>
+            <a:pPr lvl="0"/>
+            <a:r>
+              <a:rPr lang="en-US" dirty="0"/>
+              <a:t>Real data: Our prediction was right!</a:t>
+            </a:r>
+            <a:endParaRPr dirty="0"/>
+          </a:p>
+        </p:txBody>
+      </p:sp>
+      <p:grpSp>
+        <p:nvGrpSpPr>
+          <p:cNvPr id="436" name="Google Shape;436;p40">
+            <a:extLst>
+              <a:ext uri="{FF2B5EF4-FFF2-40B4-BE49-F238E27FC236}">
+                <a16:creationId xmlns:a16="http://schemas.microsoft.com/office/drawing/2014/main" id="{FD0A37B2-2DD0-1ED6-295C-1BF9F81DDC92}"/>
+              </a:ext>
+            </a:extLst>
+          </p:cNvPr>
+          <p:cNvGrpSpPr/>
+          <p:nvPr/>
+        </p:nvGrpSpPr>
+        <p:grpSpPr>
+          <a:xfrm rot="5400000">
+            <a:off x="861825" y="3983650"/>
+            <a:ext cx="536998" cy="134100"/>
+            <a:chOff x="7229775" y="947625"/>
+            <a:chExt cx="536998" cy="134100"/>
+          </a:xfrm>
+        </p:grpSpPr>
+        <p:sp>
+          <p:nvSpPr>
+            <p:cNvPr id="437" name="Google Shape;437;p40">
+              <a:extLst>
+                <a:ext uri="{FF2B5EF4-FFF2-40B4-BE49-F238E27FC236}">
+                  <a16:creationId xmlns:a16="http://schemas.microsoft.com/office/drawing/2014/main" id="{F20DDCEA-EC0C-7077-7258-7B9C28FE2A00}"/>
+                </a:ext>
+              </a:extLst>
+            </p:cNvPr>
+            <p:cNvSpPr/>
+            <p:nvPr/>
+          </p:nvSpPr>
+          <p:spPr>
+            <a:xfrm>
+              <a:off x="7229775" y="947625"/>
+              <a:ext cx="134100" cy="134100"/>
+            </a:xfrm>
+            <a:prstGeom prst="mathPlus">
+              <a:avLst>
+                <a:gd name="adj1" fmla="val 0"/>
+              </a:avLst>
+            </a:prstGeom>
+            <a:solidFill>
+              <a:schemeClr val="dk1"/>
+            </a:solidFill>
+            <a:ln w="9525" cap="flat" cmpd="sng">
+              <a:solidFill>
+                <a:schemeClr val="dk1"/>
+              </a:solidFill>
+              <a:prstDash val="solid"/>
+              <a:round/>
+              <a:headEnd type="none" w="sm" len="sm"/>
+              <a:tailEnd type="none" w="sm" len="sm"/>
+            </a:ln>
+          </p:spPr>
+          <p:txBody>
+            <a:bodyPr spcFirstLastPara="1" wrap="square" lIns="91425" tIns="91425" rIns="91425" bIns="91425" anchor="ctr" anchorCtr="0">
+              <a:noAutofit/>
+            </a:bodyPr>
+            <a:lstStyle/>
+            <a:p>
+              <a:pPr marL="0" lvl="0" indent="0" algn="ctr" rtl="0">
+                <a:spcBef>
+                  <a:spcPts val="0"/>
+                </a:spcBef>
+                <a:spcAft>
+                  <a:spcPts val="0"/>
+                </a:spcAft>
+                <a:buNone/>
+              </a:pPr>
+              <a:endParaRPr>
+                <a:latin typeface="Kanit"/>
+                <a:ea typeface="Kanit"/>
+                <a:cs typeface="Kanit"/>
+                <a:sym typeface="Kanit"/>
+              </a:endParaRPr>
+            </a:p>
+          </p:txBody>
+        </p:sp>
+        <p:sp>
+          <p:nvSpPr>
+            <p:cNvPr id="438" name="Google Shape;438;p40">
+              <a:extLst>
+                <a:ext uri="{FF2B5EF4-FFF2-40B4-BE49-F238E27FC236}">
+                  <a16:creationId xmlns:a16="http://schemas.microsoft.com/office/drawing/2014/main" id="{2F6B934A-084A-2A38-44EB-5B5F4F1163D2}"/>
+                </a:ext>
+              </a:extLst>
+            </p:cNvPr>
+            <p:cNvSpPr/>
+            <p:nvPr/>
+          </p:nvSpPr>
+          <p:spPr>
+            <a:xfrm>
+              <a:off x="7364074" y="947625"/>
+              <a:ext cx="134100" cy="134100"/>
+            </a:xfrm>
+            <a:prstGeom prst="mathPlus">
+              <a:avLst>
+                <a:gd name="adj1" fmla="val 0"/>
+              </a:avLst>
+            </a:prstGeom>
+            <a:solidFill>
+              <a:schemeClr val="dk1"/>
+            </a:solidFill>
+            <a:ln w="9525" cap="flat" cmpd="sng">
+              <a:solidFill>
+                <a:schemeClr val="dk1"/>
+              </a:solidFill>
+              <a:prstDash val="solid"/>
+              <a:round/>
+              <a:headEnd type="none" w="sm" len="sm"/>
+              <a:tailEnd type="none" w="sm" len="sm"/>
+            </a:ln>
+          </p:spPr>
+          <p:txBody>
+            <a:bodyPr spcFirstLastPara="1" wrap="square" lIns="91425" tIns="91425" rIns="91425" bIns="91425" anchor="ctr" anchorCtr="0">
+              <a:noAutofit/>
+            </a:bodyPr>
+            <a:lstStyle/>
+            <a:p>
+              <a:pPr marL="0" lvl="0" indent="0" algn="ctr" rtl="0">
+                <a:spcBef>
+                  <a:spcPts val="0"/>
+                </a:spcBef>
+                <a:spcAft>
+                  <a:spcPts val="0"/>
+                </a:spcAft>
+                <a:buNone/>
+              </a:pPr>
+              <a:endParaRPr>
+                <a:latin typeface="Kanit"/>
+                <a:ea typeface="Kanit"/>
+                <a:cs typeface="Kanit"/>
+                <a:sym typeface="Kanit"/>
+              </a:endParaRPr>
+            </a:p>
+          </p:txBody>
+        </p:sp>
+        <p:sp>
+          <p:nvSpPr>
+            <p:cNvPr id="439" name="Google Shape;439;p40">
+              <a:extLst>
+                <a:ext uri="{FF2B5EF4-FFF2-40B4-BE49-F238E27FC236}">
+                  <a16:creationId xmlns:a16="http://schemas.microsoft.com/office/drawing/2014/main" id="{98866CA3-2841-97A3-459B-6A26B3FB594B}"/>
+                </a:ext>
+              </a:extLst>
+            </p:cNvPr>
+            <p:cNvSpPr/>
+            <p:nvPr/>
+          </p:nvSpPr>
+          <p:spPr>
+            <a:xfrm>
+              <a:off x="7498374" y="947625"/>
+              <a:ext cx="134100" cy="134100"/>
+            </a:xfrm>
+            <a:prstGeom prst="mathPlus">
+              <a:avLst>
+                <a:gd name="adj1" fmla="val 0"/>
+              </a:avLst>
+            </a:prstGeom>
+            <a:solidFill>
+              <a:schemeClr val="dk1"/>
+            </a:solidFill>
+            <a:ln w="9525" cap="flat" cmpd="sng">
+              <a:solidFill>
+                <a:schemeClr val="dk1"/>
+              </a:solidFill>
+              <a:prstDash val="solid"/>
+              <a:round/>
+              <a:headEnd type="none" w="sm" len="sm"/>
+              <a:tailEnd type="none" w="sm" len="sm"/>
+            </a:ln>
+          </p:spPr>
+          <p:txBody>
+            <a:bodyPr spcFirstLastPara="1" wrap="square" lIns="91425" tIns="91425" rIns="91425" bIns="91425" anchor="ctr" anchorCtr="0">
+              <a:noAutofit/>
+            </a:bodyPr>
+            <a:lstStyle/>
+            <a:p>
+              <a:pPr marL="0" lvl="0" indent="0" algn="ctr" rtl="0">
+                <a:spcBef>
+                  <a:spcPts val="0"/>
+                </a:spcBef>
+                <a:spcAft>
+                  <a:spcPts val="0"/>
+                </a:spcAft>
+                <a:buNone/>
+              </a:pPr>
+              <a:endParaRPr>
+                <a:latin typeface="Kanit"/>
+                <a:ea typeface="Kanit"/>
+                <a:cs typeface="Kanit"/>
+                <a:sym typeface="Kanit"/>
+              </a:endParaRPr>
+            </a:p>
+          </p:txBody>
+        </p:sp>
+        <p:sp>
+          <p:nvSpPr>
+            <p:cNvPr id="440" name="Google Shape;440;p40">
+              <a:extLst>
+                <a:ext uri="{FF2B5EF4-FFF2-40B4-BE49-F238E27FC236}">
+                  <a16:creationId xmlns:a16="http://schemas.microsoft.com/office/drawing/2014/main" id="{1E437BE1-19F4-B5CC-219E-93ECA648AD89}"/>
+                </a:ext>
+              </a:extLst>
+            </p:cNvPr>
+            <p:cNvSpPr/>
+            <p:nvPr/>
+          </p:nvSpPr>
+          <p:spPr>
+            <a:xfrm>
+              <a:off x="7632673" y="947625"/>
+              <a:ext cx="134100" cy="134100"/>
+            </a:xfrm>
+            <a:prstGeom prst="mathPlus">
+              <a:avLst>
+                <a:gd name="adj1" fmla="val 0"/>
+              </a:avLst>
+            </a:prstGeom>
+            <a:solidFill>
+              <a:schemeClr val="dk1"/>
+            </a:solidFill>
+            <a:ln w="9525" cap="flat" cmpd="sng">
+              <a:solidFill>
+                <a:schemeClr val="dk1"/>
+              </a:solidFill>
+              <a:prstDash val="solid"/>
+              <a:round/>
+              <a:headEnd type="none" w="sm" len="sm"/>
+              <a:tailEnd type="none" w="sm" len="sm"/>
+            </a:ln>
+          </p:spPr>
+          <p:txBody>
+            <a:bodyPr spcFirstLastPara="1" wrap="square" lIns="91425" tIns="91425" rIns="91425" bIns="91425" anchor="ctr" anchorCtr="0">
+              <a:noAutofit/>
+            </a:bodyPr>
+            <a:lstStyle/>
+            <a:p>
+              <a:pPr marL="0" lvl="0" indent="0" algn="ctr" rtl="0">
+                <a:spcBef>
+                  <a:spcPts val="0"/>
+                </a:spcBef>
+                <a:spcAft>
+                  <a:spcPts val="0"/>
+                </a:spcAft>
+                <a:buNone/>
+              </a:pPr>
+              <a:endParaRPr>
+                <a:latin typeface="Kanit"/>
+                <a:ea typeface="Kanit"/>
+                <a:cs typeface="Kanit"/>
+                <a:sym typeface="Kanit"/>
+              </a:endParaRPr>
+            </a:p>
+          </p:txBody>
+        </p:sp>
+      </p:grpSp>
+      <p:grpSp>
+        <p:nvGrpSpPr>
+          <p:cNvPr id="441" name="Google Shape;441;p40">
+            <a:extLst>
+              <a:ext uri="{FF2B5EF4-FFF2-40B4-BE49-F238E27FC236}">
+                <a16:creationId xmlns:a16="http://schemas.microsoft.com/office/drawing/2014/main" id="{5DD20D18-BFA6-322D-0384-F418B12793E8}"/>
+              </a:ext>
+            </a:extLst>
+          </p:cNvPr>
+          <p:cNvGrpSpPr/>
+          <p:nvPr/>
+        </p:nvGrpSpPr>
+        <p:grpSpPr>
+          <a:xfrm>
+            <a:off x="8180750" y="816250"/>
+            <a:ext cx="150300" cy="378950"/>
+            <a:chOff x="205650" y="308475"/>
+            <a:chExt cx="150300" cy="378950"/>
+          </a:xfrm>
+        </p:grpSpPr>
+        <p:sp>
+          <p:nvSpPr>
+            <p:cNvPr id="442" name="Google Shape;442;p40">
+              <a:extLst>
+                <a:ext uri="{FF2B5EF4-FFF2-40B4-BE49-F238E27FC236}">
+                  <a16:creationId xmlns:a16="http://schemas.microsoft.com/office/drawing/2014/main" id="{C8A2D399-BD56-DF52-2DFA-3B287A1C61DD}"/>
+                </a:ext>
+              </a:extLst>
+            </p:cNvPr>
+            <p:cNvSpPr/>
+            <p:nvPr/>
+          </p:nvSpPr>
+          <p:spPr>
+            <a:xfrm>
+              <a:off x="205650" y="308475"/>
+              <a:ext cx="74100" cy="74100"/>
+            </a:xfrm>
+            <a:prstGeom prst="rect">
+              <a:avLst/>
+            </a:prstGeom>
+            <a:solidFill>
+              <a:schemeClr val="dk2"/>
+            </a:solidFill>
+            <a:ln>
+              <a:noFill/>
+            </a:ln>
+          </p:spPr>
+          <p:txBody>
+            <a:bodyPr spcFirstLastPara="1" wrap="square" lIns="91425" tIns="91425" rIns="91425" bIns="91425" anchor="ctr" anchorCtr="0">
+              <a:noAutofit/>
+            </a:bodyPr>
+            <a:lstStyle/>
+            <a:p>
+              <a:pPr marL="0" lvl="0" indent="0" algn="ctr" rtl="0">
+                <a:spcBef>
+                  <a:spcPts val="0"/>
+                </a:spcBef>
+                <a:spcAft>
+                  <a:spcPts val="0"/>
+                </a:spcAft>
+                <a:buNone/>
+              </a:pPr>
+              <a:endParaRPr>
+                <a:latin typeface="Kanit"/>
+                <a:ea typeface="Kanit"/>
+                <a:cs typeface="Kanit"/>
+                <a:sym typeface="Kanit"/>
+              </a:endParaRPr>
+            </a:p>
+          </p:txBody>
+        </p:sp>
+        <p:sp>
+          <p:nvSpPr>
+            <p:cNvPr id="443" name="Google Shape;443;p40">
+              <a:extLst>
+                <a:ext uri="{FF2B5EF4-FFF2-40B4-BE49-F238E27FC236}">
+                  <a16:creationId xmlns:a16="http://schemas.microsoft.com/office/drawing/2014/main" id="{CD0572D1-DEEA-B4BE-C3EC-A37681F5F6D7}"/>
+                </a:ext>
+              </a:extLst>
+            </p:cNvPr>
+            <p:cNvSpPr/>
+            <p:nvPr/>
+          </p:nvSpPr>
+          <p:spPr>
+            <a:xfrm>
+              <a:off x="281850" y="460900"/>
+              <a:ext cx="74100" cy="74100"/>
+            </a:xfrm>
+            <a:prstGeom prst="rect">
+              <a:avLst/>
+            </a:prstGeom>
+            <a:solidFill>
+              <a:schemeClr val="dk2"/>
+            </a:solidFill>
+            <a:ln>
+              <a:noFill/>
+            </a:ln>
+          </p:spPr>
+          <p:txBody>
+            <a:bodyPr spcFirstLastPara="1" wrap="square" lIns="91425" tIns="91425" rIns="91425" bIns="91425" anchor="ctr" anchorCtr="0">
+              <a:noAutofit/>
+            </a:bodyPr>
+            <a:lstStyle/>
+            <a:p>
+              <a:pPr marL="0" lvl="0" indent="0" algn="ctr" rtl="0">
+                <a:spcBef>
+                  <a:spcPts val="0"/>
+                </a:spcBef>
+                <a:spcAft>
+                  <a:spcPts val="0"/>
+                </a:spcAft>
+                <a:buNone/>
+              </a:pPr>
+              <a:endParaRPr>
+                <a:latin typeface="Kanit"/>
+                <a:ea typeface="Kanit"/>
+                <a:cs typeface="Kanit"/>
+                <a:sym typeface="Kanit"/>
+              </a:endParaRPr>
+            </a:p>
+          </p:txBody>
+        </p:sp>
+        <p:sp>
+          <p:nvSpPr>
+            <p:cNvPr id="444" name="Google Shape;444;p40">
+              <a:extLst>
+                <a:ext uri="{FF2B5EF4-FFF2-40B4-BE49-F238E27FC236}">
+                  <a16:creationId xmlns:a16="http://schemas.microsoft.com/office/drawing/2014/main" id="{A32EC900-79A3-98E9-AEF4-86E8343DC4DF}"/>
+                </a:ext>
+              </a:extLst>
+            </p:cNvPr>
+            <p:cNvSpPr/>
+            <p:nvPr/>
+          </p:nvSpPr>
+          <p:spPr>
+            <a:xfrm>
+              <a:off x="205650" y="613325"/>
+              <a:ext cx="74100" cy="74100"/>
+            </a:xfrm>
+            <a:prstGeom prst="rect">
+              <a:avLst/>
+            </a:prstGeom>
+            <a:solidFill>
+              <a:schemeClr val="dk2"/>
+            </a:solidFill>
+            <a:ln>
+              <a:noFill/>
+            </a:ln>
+          </p:spPr>
+          <p:txBody>
+            <a:bodyPr spcFirstLastPara="1" wrap="square" lIns="91425" tIns="91425" rIns="91425" bIns="91425" anchor="ctr" anchorCtr="0">
+              <a:noAutofit/>
+            </a:bodyPr>
+            <a:lstStyle/>
+            <a:p>
+              <a:pPr marL="0" lvl="0" indent="0" algn="ctr" rtl="0">
+                <a:spcBef>
+                  <a:spcPts val="0"/>
+                </a:spcBef>
+                <a:spcAft>
+                  <a:spcPts val="0"/>
+                </a:spcAft>
+                <a:buNone/>
+              </a:pPr>
+              <a:endParaRPr>
+                <a:latin typeface="Kanit"/>
+                <a:ea typeface="Kanit"/>
+                <a:cs typeface="Kanit"/>
+                <a:sym typeface="Kanit"/>
+              </a:endParaRPr>
+            </a:p>
+          </p:txBody>
+        </p:sp>
+      </p:grpSp>
+      <p:pic>
+        <p:nvPicPr>
+          <p:cNvPr id="1026" name="Picture 2" descr="Hollow Knight: Silksong on Steam">
+            <a:extLst>
+              <a:ext uri="{FF2B5EF4-FFF2-40B4-BE49-F238E27FC236}">
+                <a16:creationId xmlns:a16="http://schemas.microsoft.com/office/drawing/2014/main" id="{BE4F54DD-E3CA-91DA-3A0D-F7E3B2FEEBA8}"/>
+              </a:ext>
+            </a:extLst>
+          </p:cNvPr>
+          <p:cNvPicPr>
+            <a:picLocks noChangeAspect="1" noChangeArrowheads="1"/>
+          </p:cNvPicPr>
+          <p:nvPr/>
+        </p:nvPicPr>
+        <p:blipFill>
+          <a:blip r:embed="rId3">
+            <a:extLst>
+              <a:ext uri="{28A0092B-C50C-407E-A947-70E740481C1C}">
+                <a14:useLocalDpi xmlns:a14="http://schemas.microsoft.com/office/drawing/2010/main" val="0"/>
+              </a:ext>
+            </a:extLst>
+          </a:blip>
+          <a:srcRect/>
+          <a:stretch>
+            <a:fillRect/>
+          </a:stretch>
+        </p:blipFill>
+        <p:spPr bwMode="auto">
+          <a:xfrm>
+            <a:off x="796630" y="1413948"/>
+            <a:ext cx="3041608" cy="1421621"/>
+          </a:xfrm>
+          <a:prstGeom prst="rect">
+            <a:avLst/>
+          </a:prstGeom>
+          <a:noFill/>
+          <a:extLst>
+            <a:ext uri="{909E8E84-426E-40DD-AFC4-6F175D3DCCD1}">
+              <a14:hiddenFill xmlns:a14="http://schemas.microsoft.com/office/drawing/2010/main">
+                <a:solidFill>
+                  <a:srgbClr val="FFFFFF"/>
+                </a:solidFill>
+              </a14:hiddenFill>
+            </a:ext>
+          </a:extLst>
+        </p:spPr>
+      </p:pic>
+      <p:pic>
+        <p:nvPicPr>
+          <p:cNvPr id="1028" name="Picture 4" descr="Cyberpunk 2077 - Wikipedia">
+            <a:extLst>
+              <a:ext uri="{FF2B5EF4-FFF2-40B4-BE49-F238E27FC236}">
+                <a16:creationId xmlns:a16="http://schemas.microsoft.com/office/drawing/2014/main" id="{051801C2-0A73-C911-357E-F591CC718723}"/>
+              </a:ext>
+            </a:extLst>
+          </p:cNvPr>
+          <p:cNvPicPr>
+            <a:picLocks noChangeAspect="1" noChangeArrowheads="1"/>
+          </p:cNvPicPr>
+          <p:nvPr/>
+        </p:nvPicPr>
+        <p:blipFill>
+          <a:blip r:embed="rId4">
+            <a:extLst>
+              <a:ext uri="{28A0092B-C50C-407E-A947-70E740481C1C}">
+                <a14:useLocalDpi xmlns:a14="http://schemas.microsoft.com/office/drawing/2010/main" val="0"/>
+              </a:ext>
+            </a:extLst>
+          </a:blip>
+          <a:srcRect/>
+          <a:stretch>
+            <a:fillRect/>
+          </a:stretch>
+        </p:blipFill>
+        <p:spPr bwMode="auto">
+          <a:xfrm>
+            <a:off x="4060041" y="1674592"/>
+            <a:ext cx="1902772" cy="2233688"/>
+          </a:xfrm>
+          <a:prstGeom prst="rect">
+            <a:avLst/>
+          </a:prstGeom>
+          <a:noFill/>
+          <a:extLst>
+            <a:ext uri="{909E8E84-426E-40DD-AFC4-6F175D3DCCD1}">
+              <a14:hiddenFill xmlns:a14="http://schemas.microsoft.com/office/drawing/2010/main">
+                <a:solidFill>
+                  <a:srgbClr val="FFFFFF"/>
+                </a:solidFill>
+              </a14:hiddenFill>
+            </a:ext>
+          </a:extLst>
+        </p:spPr>
+      </p:pic>
+      <p:pic>
+        <p:nvPicPr>
+          <p:cNvPr id="1030" name="Picture 6" descr="Prince of Persia: The Lost Crown - Wikipedia">
+            <a:extLst>
+              <a:ext uri="{FF2B5EF4-FFF2-40B4-BE49-F238E27FC236}">
+                <a16:creationId xmlns:a16="http://schemas.microsoft.com/office/drawing/2014/main" id="{140C41B3-80B4-17E1-20C0-E976C3A6C647}"/>
+              </a:ext>
+            </a:extLst>
+          </p:cNvPr>
+          <p:cNvPicPr>
+            <a:picLocks noChangeAspect="1" noChangeArrowheads="1"/>
+          </p:cNvPicPr>
+          <p:nvPr/>
+        </p:nvPicPr>
+        <p:blipFill>
+          <a:blip r:embed="rId5">
+            <a:extLst>
+              <a:ext uri="{28A0092B-C50C-407E-A947-70E740481C1C}">
+                <a14:useLocalDpi xmlns:a14="http://schemas.microsoft.com/office/drawing/2010/main" val="0"/>
+              </a:ext>
+            </a:extLst>
+          </a:blip>
+          <a:srcRect/>
+          <a:stretch>
+            <a:fillRect/>
+          </a:stretch>
+        </p:blipFill>
+        <p:spPr bwMode="auto">
+          <a:xfrm>
+            <a:off x="6231205" y="2105803"/>
+            <a:ext cx="1785353" cy="2392741"/>
+          </a:xfrm>
+          <a:prstGeom prst="rect">
+            <a:avLst/>
+          </a:prstGeom>
+          <a:noFill/>
+          <a:extLst>
+            <a:ext uri="{909E8E84-426E-40DD-AFC4-6F175D3DCCD1}">
+              <a14:hiddenFill xmlns:a14="http://schemas.microsoft.com/office/drawing/2010/main">
+                <a:solidFill>
+                  <a:srgbClr val="FFFFFF"/>
+                </a:solidFill>
+              </a14:hiddenFill>
+            </a:ext>
+          </a:extLst>
+        </p:spPr>
+      </p:pic>
+      <p:pic>
+        <p:nvPicPr>
+          <p:cNvPr id="4" name="Picture 3">
+            <a:extLst>
+              <a:ext uri="{FF2B5EF4-FFF2-40B4-BE49-F238E27FC236}">
+                <a16:creationId xmlns:a16="http://schemas.microsoft.com/office/drawing/2014/main" id="{B3E109A1-820A-2903-FF18-4BD118CA150B}"/>
+              </a:ext>
+            </a:extLst>
+          </p:cNvPr>
+          <p:cNvPicPr>
+            <a:picLocks noChangeAspect="1"/>
+          </p:cNvPicPr>
+          <p:nvPr/>
+        </p:nvPicPr>
+        <p:blipFill>
+          <a:blip r:embed="rId6">
+            <a:extLst>
+              <a:ext uri="{BEBA8EAE-BF5A-486C-A8C5-ECC9F3942E4B}">
+                <a14:imgProps xmlns:a14="http://schemas.microsoft.com/office/drawing/2010/main">
+                  <a14:imgLayer r:embed="rId7">
+                    <a14:imgEffect>
+                      <a14:backgroundRemoval t="10000" b="90000" l="10000" r="90000">
+                        <a14:foregroundMark x1="64024" y1="17442" x2="64024" y2="17442"/>
+                        <a14:foregroundMark x1="42683" y1="12209" x2="42683" y2="12209"/>
+                        <a14:foregroundMark x1="28659" y1="10465" x2="28659" y2="10465"/>
+                      </a14:backgroundRemoval>
+                    </a14:imgEffect>
+                  </a14:imgLayer>
+                </a14:imgProps>
+              </a:ext>
+            </a:extLst>
+          </a:blip>
+          <a:stretch>
+            <a:fillRect/>
+          </a:stretch>
+        </p:blipFill>
+        <p:spPr>
+          <a:xfrm>
+            <a:off x="6591298" y="1179158"/>
+            <a:ext cx="1041400" cy="1092200"/>
+          </a:xfrm>
+          <a:prstGeom prst="rect">
+            <a:avLst/>
+          </a:prstGeom>
+        </p:spPr>
+      </p:pic>
+      <p:pic>
+        <p:nvPicPr>
+          <p:cNvPr id="5" name="Picture 4">
+            <a:extLst>
+              <a:ext uri="{FF2B5EF4-FFF2-40B4-BE49-F238E27FC236}">
+                <a16:creationId xmlns:a16="http://schemas.microsoft.com/office/drawing/2014/main" id="{F016FCE7-4268-E17A-B320-54089D35A5BA}"/>
+              </a:ext>
+            </a:extLst>
+          </p:cNvPr>
+          <p:cNvPicPr>
+            <a:picLocks noChangeAspect="1"/>
+          </p:cNvPicPr>
+          <p:nvPr/>
+        </p:nvPicPr>
+        <p:blipFill>
+          <a:blip r:embed="rId8">
+            <a:extLst>
+              <a:ext uri="{BEBA8EAE-BF5A-486C-A8C5-ECC9F3942E4B}">
+                <a14:imgProps xmlns:a14="http://schemas.microsoft.com/office/drawing/2010/main">
+                  <a14:imgLayer r:embed="rId9">
+                    <a14:imgEffect>
+                      <a14:backgroundRemoval t="10000" b="90000" l="10000" r="90000">
+                        <a14:foregroundMark x1="85185" y1="42857" x2="85185" y2="42857"/>
+                        <a14:foregroundMark x1="87037" y1="57738" x2="87037" y2="57738"/>
+                        <a14:foregroundMark x1="84568" y1="56548" x2="84568" y2="56548"/>
+                      </a14:backgroundRemoval>
+                    </a14:imgEffect>
+                  </a14:imgLayer>
+                </a14:imgProps>
+              </a:ext>
+            </a:extLst>
+          </a:blip>
+          <a:stretch>
+            <a:fillRect/>
+          </a:stretch>
+        </p:blipFill>
+        <p:spPr>
+          <a:xfrm>
+            <a:off x="4497077" y="3849251"/>
+            <a:ext cx="1028700" cy="1066800"/>
+          </a:xfrm>
+          <a:prstGeom prst="rect">
+            <a:avLst/>
+          </a:prstGeom>
+        </p:spPr>
+      </p:pic>
+      <p:pic>
+        <p:nvPicPr>
+          <p:cNvPr id="7" name="Picture 6">
+            <a:extLst>
+              <a:ext uri="{FF2B5EF4-FFF2-40B4-BE49-F238E27FC236}">
+                <a16:creationId xmlns:a16="http://schemas.microsoft.com/office/drawing/2014/main" id="{16554DFB-4989-B69E-9134-8FAE61947A67}"/>
+              </a:ext>
+            </a:extLst>
+          </p:cNvPr>
+          <p:cNvPicPr>
+            <a:picLocks noChangeAspect="1"/>
+          </p:cNvPicPr>
+          <p:nvPr/>
+        </p:nvPicPr>
+        <p:blipFill>
+          <a:blip r:embed="rId10">
+            <a:extLst>
+              <a:ext uri="{BEBA8EAE-BF5A-486C-A8C5-ECC9F3942E4B}">
+                <a14:imgProps xmlns:a14="http://schemas.microsoft.com/office/drawing/2010/main">
+                  <a14:imgLayer r:embed="rId11">
+                    <a14:imgEffect>
+                      <a14:backgroundRemoval t="9877" b="89506" l="4375" r="90000">
+                        <a14:foregroundMark x1="4375" y1="53704" x2="4375" y2="53704"/>
+                      </a14:backgroundRemoval>
+                    </a14:imgEffect>
+                  </a14:imgLayer>
+                </a14:imgProps>
+              </a:ext>
+            </a:extLst>
+          </a:blip>
+          <a:stretch>
+            <a:fillRect/>
+          </a:stretch>
+        </p:blipFill>
+        <p:spPr>
+          <a:xfrm>
+            <a:off x="1809434" y="2787823"/>
+            <a:ext cx="1016000" cy="1028700"/>
+          </a:xfrm>
+          <a:prstGeom prst="rect">
+            <a:avLst/>
+          </a:prstGeom>
+        </p:spPr>
+      </p:pic>
+    </p:spTree>
+    <p:extLst>
+      <p:ext uri="{BB962C8B-B14F-4D97-AF65-F5344CB8AC3E}">
+        <p14:creationId xmlns:p14="http://schemas.microsoft.com/office/powerpoint/2010/main" val="94424230"/>
+      </p:ext>
+    </p:extLst>
+  </p:cSld>
+  <p:clrMapOvr>
+    <a:masterClrMapping/>
+  </p:clrMapOvr>
+</p:sld>
+</file>
+
+<file path=ppt/slides/slide17.xml><?xml version="1.0" encoding="utf-8"?>
+<p:sld xmlns:a="http://schemas.openxmlformats.org/drawingml/2006/main" xmlns:r="http://schemas.openxmlformats.org/officeDocument/2006/relationships" xmlns:p="http://schemas.openxmlformats.org/presentationml/2006/main">
+  <p:cSld>
+    <p:spTree>
+      <p:nvGrpSpPr>
         <p:cNvPr id="1" name="Shape 240">
           <a:extLst>
             <a:ext uri="{FF2B5EF4-FFF2-40B4-BE49-F238E27FC236}">
@@ -20270,7 +21182,7 @@
         </p:blipFill>
         <p:spPr>
           <a:xfrm>
-            <a:off x="4985722" y="3345514"/>
+            <a:off x="4969680" y="3345514"/>
             <a:ext cx="907571" cy="907571"/>
           </a:xfrm>
           <a:prstGeom prst="rect">
@@ -22225,9 +23137,28 @@
           </a:p>
           <a:p>
             <a:pPr marL="0" lvl="0" indent="0"/>
+            <a:endParaRPr lang="en" dirty="0"/>
+          </a:p>
+          <a:p>
+            <a:pPr marL="0" lvl="0" indent="0"/>
             <a:r>
               <a:rPr lang="en" dirty="0"/>
               <a:t>~12,000 unique values</a:t>
+            </a:r>
+          </a:p>
+          <a:p>
+            <a:pPr marL="0" lvl="0" indent="0"/>
+            <a:endParaRPr lang="en" dirty="0"/>
+          </a:p>
+          <a:p>
+            <a:pPr marL="0" lvl="0" indent="0"/>
+            <a:r>
+              <a:rPr lang="en" dirty="0"/>
+              <a:t>Sources: Kaggle, </a:t>
+            </a:r>
+            <a:r>
+              <a:rPr lang="en-US" dirty="0" err="1"/>
+              <a:t>vgchartz.com</a:t>
             </a:r>
             <a:endParaRPr dirty="0"/>
           </a:p>
@@ -22321,7 +23252,7 @@
         <p:spPr>
           <a:xfrm>
             <a:off x="4683250" y="2686775"/>
-            <a:ext cx="3447300" cy="1214100"/>
+            <a:ext cx="3447300" cy="1468130"/>
           </a:xfrm>
           <a:prstGeom prst="rect">
             <a:avLst/>
@@ -22336,7 +23267,34 @@
             <a:pPr marL="0" lvl="0" indent="0"/>
             <a:r>
               <a:rPr lang="en" dirty="0"/>
-              <a:t>Game ratings (critic + user) </a:t>
+              <a:t>Game ratings based on </a:t>
+            </a:r>
+            <a:r>
+              <a:rPr lang="en" dirty="0" err="1"/>
+              <a:t>Metascore</a:t>
+            </a:r>
+            <a:endParaRPr lang="en" dirty="0"/>
+          </a:p>
+          <a:p>
+            <a:pPr marL="0" lvl="0" indent="0"/>
+            <a:r>
+              <a:rPr lang="en" dirty="0"/>
+              <a:t>(</a:t>
+            </a:r>
+            <a:r>
+              <a:rPr lang="en-US" b="1" dirty="0"/>
+              <a:t>a weighted average of reviews from top critics, publications and users</a:t>
+            </a:r>
+            <a:r>
+              <a:rPr lang="en" dirty="0"/>
+              <a:t>)</a:t>
+            </a:r>
+          </a:p>
+          <a:p>
+            <a:pPr marL="0" lvl="0" indent="0"/>
+            <a:r>
+              <a:rPr lang="en" dirty="0"/>
+              <a:t> </a:t>
             </a:r>
           </a:p>
           <a:p>
@@ -22344,6 +23302,21 @@
             <a:r>
               <a:rPr lang="en" dirty="0"/>
               <a:t>~19,000 unique values</a:t>
+            </a:r>
+          </a:p>
+          <a:p>
+            <a:pPr marL="0" lvl="0" indent="0"/>
+            <a:endParaRPr lang="en" dirty="0"/>
+          </a:p>
+          <a:p>
+            <a:pPr marL="0" lvl="0" indent="0"/>
+            <a:r>
+              <a:rPr lang="en" dirty="0"/>
+              <a:t>Source: Kaggle, </a:t>
+            </a:r>
+            <a:r>
+              <a:rPr lang="en-US" dirty="0" err="1"/>
+              <a:t>metacritic.com</a:t>
             </a:r>
             <a:endParaRPr dirty="0"/>
           </a:p>
@@ -22526,6 +23499,51 @@
           </p:txBody>
         </p:sp>
       </p:grpSp>
+      <p:cxnSp>
+        <p:nvCxnSpPr>
+          <p:cNvPr id="4" name="Straight Connector 3">
+            <a:extLst>
+              <a:ext uri="{FF2B5EF4-FFF2-40B4-BE49-F238E27FC236}">
+                <a16:creationId xmlns:a16="http://schemas.microsoft.com/office/drawing/2014/main" id="{97945EEB-5CF4-4889-76F9-801345452056}"/>
+              </a:ext>
+            </a:extLst>
+          </p:cNvPr>
+          <p:cNvCxnSpPr/>
+          <p:nvPr/>
+        </p:nvCxnSpPr>
+        <p:spPr>
+          <a:xfrm>
+            <a:off x="3569368" y="2326710"/>
+            <a:ext cx="1796716" cy="0"/>
+          </a:xfrm>
+          <a:prstGeom prst="line">
+            <a:avLst/>
+          </a:prstGeom>
+          <a:ln w="38100" cap="flat" cmpd="sng" algn="ctr">
+            <a:solidFill>
+              <a:srgbClr val="6ABFDB"/>
+            </a:solidFill>
+            <a:prstDash val="dash"/>
+            <a:round/>
+            <a:headEnd type="arrow" w="med" len="med"/>
+            <a:tailEnd type="arrow" w="med" len="med"/>
+          </a:ln>
+        </p:spPr>
+        <p:style>
+          <a:lnRef idx="0">
+            <a:scrgbClr r="0" g="0" b="0"/>
+          </a:lnRef>
+          <a:fillRef idx="0">
+            <a:scrgbClr r="0" g="0" b="0"/>
+          </a:fillRef>
+          <a:effectRef idx="0">
+            <a:scrgbClr r="0" g="0" b="0"/>
+          </a:effectRef>
+          <a:fontRef idx="minor">
+            <a:schemeClr val="tx1"/>
+          </a:fontRef>
+        </p:style>
+      </p:cxnSp>
     </p:spTree>
   </p:cSld>
   <p:clrMapOvr>

</xml_diff>